<commit_message>
tokenized IP addresses and keys
</commit_message>
<xml_diff>
--- a/Invoke-RestMethod_DeepDive.pptx
+++ b/Invoke-RestMethod_DeepDive.pptx
@@ -10,8 +10,7 @@
     <p:sldId id="259" r:id="rId4"/>
     <p:sldId id="260" r:id="rId5"/>
     <p:sldId id="262" r:id="rId6"/>
-    <p:sldId id="264" r:id="rId7"/>
-    <p:sldId id="263" r:id="rId8"/>
+    <p:sldId id="263" r:id="rId7"/>
   </p:sldIdLst>
   <p:sldSz cx="12192000" cy="6858000"/>
   <p:notesSz cx="6858000" cy="9144000"/>
@@ -3793,15 +3792,7 @@
                   <a:schemeClr val="bg1"/>
                 </a:solidFill>
               </a:rPr>
-              <a:t>&gt; </a:t>
-            </a:r>
-            <a:r>
-              <a:rPr lang="en-PH" dirty="0">
-                <a:solidFill>
-                  <a:schemeClr val="bg1"/>
-                </a:solidFill>
-              </a:rPr>
-              <a:t>Import-Module ./build.psm1</a:t>
+              <a:t>&gt; Import-Module ./build.psm1</a:t>
             </a:r>
           </a:p>
           <a:p>
@@ -3880,11 +3871,6 @@
               </a:rPr>
               <a:t>Reference: https://github.com/PowerShell/PowerShell/blob/master/docs/building/windows-core.md</a:t>
             </a:r>
-            <a:endParaRPr lang="en-PH" sz="2400" dirty="0">
-              <a:solidFill>
-                <a:schemeClr val="bg1"/>
-              </a:solidFill>
-            </a:endParaRPr>
           </a:p>
         </p:txBody>
       </p:sp>
@@ -4186,21 +4172,8 @@
                   <a:schemeClr val="bg1"/>
                 </a:solidFill>
               </a:rPr>
-              <a:t>Reference: </a:t>
-            </a:r>
-            <a:r>
-              <a:rPr lang="en-PH" dirty="0">
-                <a:solidFill>
-                  <a:schemeClr val="bg1"/>
-                </a:solidFill>
-              </a:rPr>
-              <a:t>https://github.com/PowerShell/PowerShell/blob/master/docs/installation/linux.md</a:t>
-            </a:r>
-            <a:endParaRPr lang="en-PH" dirty="0">
-              <a:solidFill>
-                <a:schemeClr val="bg1"/>
-              </a:solidFill>
-            </a:endParaRPr>
+              <a:t>Reference: https://github.com/PowerShell/PowerShell/blob/master/docs/installation/linux.md</a:t>
+            </a:r>
           </a:p>
         </p:txBody>
       </p:sp>
@@ -4441,110 +4414,71 @@
         </p:nvSpPr>
         <p:spPr/>
         <p:txBody>
-          <a:bodyPr/>
-          <a:lstStyle/>
-          <a:p>
-            <a:endParaRPr lang="en-PH"/>
-          </a:p>
-        </p:txBody>
-      </p:sp>
-      <p:sp>
-        <p:nvSpPr>
-          <p:cNvPr id="3" name="Title 2"/>
-          <p:cNvSpPr>
-            <a:spLocks noGrp="1"/>
-          </p:cNvSpPr>
-          <p:nvPr>
-            <p:ph type="title"/>
-          </p:nvPr>
-        </p:nvSpPr>
-        <p:spPr/>
-        <p:txBody>
-          <a:bodyPr/>
-          <a:lstStyle/>
-          <a:p>
-            <a:r>
-              <a:rPr lang="en-PH" dirty="0"/>
-              <a:t>Invoke-</a:t>
-            </a:r>
-            <a:r>
-              <a:rPr lang="en-PH" dirty="0" err="1"/>
-              <a:t>RestMethod</a:t>
-            </a:r>
-            <a:endParaRPr lang="en-PH" dirty="0"/>
-          </a:p>
-        </p:txBody>
-      </p:sp>
-    </p:spTree>
-    <p:extLst>
-      <p:ext uri="{BB962C8B-B14F-4D97-AF65-F5344CB8AC3E}">
-        <p14:creationId xmlns:p14="http://schemas.microsoft.com/office/powerpoint/2010/main" val="748588877"/>
-      </p:ext>
-    </p:extLst>
-  </p:cSld>
-  <p:clrMapOvr>
-    <a:masterClrMapping/>
-  </p:clrMapOvr>
-</p:sld>
-</file>
-
-<file path=ppt/slides/slide7.xml><?xml version="1.0" encoding="utf-8"?>
-<p:sld xmlns:a="http://schemas.openxmlformats.org/drawingml/2006/main" xmlns:r="http://schemas.openxmlformats.org/officeDocument/2006/relationships" xmlns:p="http://schemas.openxmlformats.org/presentationml/2006/main">
-  <p:cSld>
-    <p:spTree>
-      <p:nvGrpSpPr>
-        <p:cNvPr id="1" name=""/>
-        <p:cNvGrpSpPr/>
-        <p:nvPr/>
-      </p:nvGrpSpPr>
-      <p:grpSpPr>
-        <a:xfrm>
-          <a:off x="0" y="0"/>
-          <a:ext cx="0" cy="0"/>
-          <a:chOff x="0" y="0"/>
-          <a:chExt cx="0" cy="0"/>
-        </a:xfrm>
-      </p:grpSpPr>
-      <p:sp>
-        <p:nvSpPr>
-          <p:cNvPr id="2" name="Content Placeholder 1"/>
-          <p:cNvSpPr>
-            <a:spLocks noGrp="1"/>
-          </p:cNvSpPr>
-          <p:nvPr>
-            <p:ph idx="1"/>
-          </p:nvPr>
-        </p:nvSpPr>
-        <p:spPr/>
-        <p:txBody>
-          <a:bodyPr/>
-          <a:lstStyle/>
-          <a:p>
-            <a:pPr marL="514350" indent="-514350">
-              <a:buFont typeface="+mj-lt"/>
-              <a:buAutoNum type="arabicPeriod"/>
-            </a:pPr>
+          <a:bodyPr>
+            <a:normAutofit/>
+          </a:bodyPr>
+          <a:lstStyle/>
+          <a:p>
             <a:r>
               <a:rPr lang="en-PH" dirty="0">
                 <a:solidFill>
                   <a:schemeClr val="bg1"/>
                 </a:solidFill>
               </a:rPr>
-              <a:t>Install VS Code</a:t>
-            </a:r>
-          </a:p>
-          <a:p>
-            <a:pPr marL="514350" indent="-514350">
-              <a:buFont typeface="+mj-lt"/>
-              <a:buAutoNum type="arabicPeriod"/>
-            </a:pPr>
+              <a:t>https://github.com/whatevergeek/dotnetdevmeetup_9nov2016</a:t>
+            </a:r>
+          </a:p>
+          <a:p>
+            <a:endParaRPr lang="en-PH" dirty="0">
+              <a:solidFill>
+                <a:schemeClr val="bg1"/>
+              </a:solidFill>
+            </a:endParaRPr>
+          </a:p>
+          <a:p>
+            <a:endParaRPr lang="en-PH" dirty="0">
+              <a:solidFill>
+                <a:schemeClr val="bg1"/>
+              </a:solidFill>
+            </a:endParaRPr>
+          </a:p>
+          <a:p>
+            <a:endParaRPr lang="en-PH" dirty="0">
+              <a:solidFill>
+                <a:schemeClr val="bg1"/>
+              </a:solidFill>
+            </a:endParaRPr>
+          </a:p>
+          <a:p>
+            <a:endParaRPr lang="en-PH" dirty="0">
+              <a:solidFill>
+                <a:schemeClr val="bg1"/>
+              </a:solidFill>
+            </a:endParaRPr>
+          </a:p>
+          <a:p>
+            <a:endParaRPr lang="en-PH" dirty="0">
+              <a:solidFill>
+                <a:schemeClr val="bg1"/>
+              </a:solidFill>
+            </a:endParaRPr>
+          </a:p>
+          <a:p>
+            <a:r>
+              <a:rPr lang="en-PH">
+                <a:solidFill>
+                  <a:schemeClr val="bg1"/>
+                </a:solidFill>
+              </a:rPr>
+              <a:t>Twitter</a:t>
+            </a:r>
             <a:r>
               <a:rPr lang="en-PH" dirty="0">
                 <a:solidFill>
                   <a:schemeClr val="bg1"/>
                 </a:solidFill>
               </a:rPr>
-              <a:t>Install .NET Core Debugger (</a:t>
+              <a:t>: @</a:t>
             </a:r>
             <a:r>
               <a:rPr lang="en-PH" dirty="0" err="1">
@@ -4552,18 +4486,8 @@
                   <a:schemeClr val="bg1"/>
                 </a:solidFill>
               </a:rPr>
-              <a:t>ctrl+shift+p</a:t>
-            </a:r>
-            <a:r>
-              <a:rPr lang="en-PH" dirty="0">
-                <a:solidFill>
-                  <a:schemeClr val="bg1"/>
-                </a:solidFill>
-              </a:rPr>
-              <a:t>)</a:t>
-            </a:r>
-          </a:p>
-          <a:p>
+              <a:t>whatevergeek</a:t>
+            </a:r>
             <a:endParaRPr lang="en-PH" dirty="0">
               <a:solidFill>
                 <a:schemeClr val="bg1"/>
@@ -4607,16 +4531,154 @@
           <a:p>
             <a:r>
               <a:rPr lang="en-PH" dirty="0"/>
-              <a:t>Debug Invoke-</a:t>
-            </a:r>
-            <a:r>
-              <a:rPr lang="en-PH" dirty="0" err="1"/>
-              <a:t>RestMethod</a:t>
-            </a:r>
-            <a:endParaRPr lang="en-PH" dirty="0"/>
-          </a:p>
-        </p:txBody>
-      </p:sp>
+              <a:t>Demo on Devices</a:t>
+            </a:r>
+          </a:p>
+        </p:txBody>
+      </p:sp>
+      <p:pic>
+        <p:nvPicPr>
+          <p:cNvPr id="7" name="Picture 8" descr="Image result for raspberry pi transparent background"/>
+          <p:cNvPicPr>
+            <a:picLocks noChangeAspect="1" noChangeArrowheads="1"/>
+          </p:cNvPicPr>
+          <p:nvPr/>
+        </p:nvPicPr>
+        <p:blipFill>
+          <a:blip r:embed="rId2" cstate="print">
+            <a:extLst>
+              <a:ext uri="{28A0092B-C50C-407E-A947-70E740481C1C}">
+                <a14:useLocalDpi xmlns:a14="http://schemas.microsoft.com/office/drawing/2010/main" val="0"/>
+              </a:ext>
+            </a:extLst>
+          </a:blip>
+          <a:srcRect/>
+          <a:stretch>
+            <a:fillRect/>
+          </a:stretch>
+        </p:blipFill>
+        <p:spPr bwMode="auto">
+          <a:xfrm>
+            <a:off x="6708913" y="3440380"/>
+            <a:ext cx="4598504" cy="2874065"/>
+          </a:xfrm>
+          <a:prstGeom prst="rect">
+            <a:avLst/>
+          </a:prstGeom>
+          <a:noFill/>
+          <a:extLst>
+            <a:ext uri="{909E8E84-426E-40DD-AFC4-6F175D3DCCD1}">
+              <a14:hiddenFill xmlns:a14="http://schemas.microsoft.com/office/drawing/2010/main">
+                <a:solidFill>
+                  <a:srgbClr val="FFFFFF"/>
+                </a:solidFill>
+              </a14:hiddenFill>
+            </a:ext>
+          </a:extLst>
+        </p:spPr>
+      </p:pic>
+      <p:pic>
+        <p:nvPicPr>
+          <p:cNvPr id="8" name="Picture 12" descr="Image result for nodemcu transparent background"/>
+          <p:cNvPicPr>
+            <a:picLocks noChangeAspect="1" noChangeArrowheads="1"/>
+          </p:cNvPicPr>
+          <p:nvPr/>
+        </p:nvPicPr>
+        <p:blipFill>
+          <a:blip r:embed="rId3" cstate="print">
+            <a:extLst>
+              <a:ext uri="{28A0092B-C50C-407E-A947-70E740481C1C}">
+                <a14:useLocalDpi xmlns:a14="http://schemas.microsoft.com/office/drawing/2010/main" val="0"/>
+              </a:ext>
+            </a:extLst>
+          </a:blip>
+          <a:srcRect/>
+          <a:stretch>
+            <a:fillRect/>
+          </a:stretch>
+        </p:blipFill>
+        <p:spPr bwMode="auto">
+          <a:xfrm>
+            <a:off x="1367112" y="3229936"/>
+            <a:ext cx="1653970" cy="891408"/>
+          </a:xfrm>
+          <a:prstGeom prst="rect">
+            <a:avLst/>
+          </a:prstGeom>
+          <a:noFill/>
+          <a:extLst>
+            <a:ext uri="{909E8E84-426E-40DD-AFC4-6F175D3DCCD1}">
+              <a14:hiddenFill xmlns:a14="http://schemas.microsoft.com/office/drawing/2010/main">
+                <a:solidFill>
+                  <a:srgbClr val="FFFFFF"/>
+                </a:solidFill>
+              </a14:hiddenFill>
+            </a:ext>
+          </a:extLst>
+        </p:spPr>
+      </p:pic>
+      <p:pic>
+        <p:nvPicPr>
+          <p:cNvPr id="9" name="Picture 16" descr="Image result"/>
+          <p:cNvPicPr>
+            <a:picLocks noChangeAspect="1" noChangeArrowheads="1"/>
+          </p:cNvPicPr>
+          <p:nvPr/>
+        </p:nvPicPr>
+        <p:blipFill>
+          <a:blip r:embed="rId4" cstate="print">
+            <a:extLst>
+              <a:ext uri="{28A0092B-C50C-407E-A947-70E740481C1C}">
+                <a14:useLocalDpi xmlns:a14="http://schemas.microsoft.com/office/drawing/2010/main" val="0"/>
+              </a:ext>
+            </a:extLst>
+          </a:blip>
+          <a:srcRect/>
+          <a:stretch>
+            <a:fillRect/>
+          </a:stretch>
+        </p:blipFill>
+        <p:spPr bwMode="auto">
+          <a:xfrm>
+            <a:off x="6321287" y="1827953"/>
+            <a:ext cx="2297763" cy="1698908"/>
+          </a:xfrm>
+          <a:prstGeom prst="ellipse">
+            <a:avLst/>
+          </a:prstGeom>
+          <a:ln>
+            <a:noFill/>
+          </a:ln>
+          <a:effectLst>
+            <a:softEdge rad="112500"/>
+          </a:effectLst>
+        </p:spPr>
+      </p:pic>
+      <p:pic>
+        <p:nvPicPr>
+          <p:cNvPr id="10" name="Picture 9"/>
+          <p:cNvPicPr>
+            <a:picLocks noChangeAspect="1"/>
+          </p:cNvPicPr>
+          <p:nvPr/>
+        </p:nvPicPr>
+        <p:blipFill>
+          <a:blip r:embed="rId5"/>
+          <a:stretch>
+            <a:fillRect/>
+          </a:stretch>
+        </p:blipFill>
+        <p:spPr>
+          <a:xfrm>
+            <a:off x="4204252" y="2037281"/>
+            <a:ext cx="1681135" cy="2646230"/>
+          </a:xfrm>
+          <a:prstGeom prst="rect">
+            <a:avLst/>
+          </a:prstGeom>
+        </p:spPr>
+      </p:pic>
     </p:spTree>
     <p:extLst>
       <p:ext uri="{BB962C8B-B14F-4D97-AF65-F5344CB8AC3E}">

</xml_diff>